<commit_message>
L04 Fix invalid screenshots in homework overview
</commit_message>
<xml_diff>
--- a/Lectures/Lesson 04 - Homework Review.pptx
+++ b/Lectures/Lesson 04 - Homework Review.pptx
@@ -13,13 +13,13 @@
     <p:sldId id="304" r:id="rId4"/>
     <p:sldId id="302" r:id="rId5"/>
     <p:sldId id="294" r:id="rId6"/>
-    <p:sldId id="297" r:id="rId7"/>
-    <p:sldId id="295" r:id="rId8"/>
-    <p:sldId id="296" r:id="rId9"/>
-    <p:sldId id="298" r:id="rId10"/>
-    <p:sldId id="299" r:id="rId11"/>
-    <p:sldId id="300" r:id="rId12"/>
-    <p:sldId id="301" r:id="rId13"/>
+    <p:sldId id="301" r:id="rId7"/>
+    <p:sldId id="297" r:id="rId8"/>
+    <p:sldId id="295" r:id="rId9"/>
+    <p:sldId id="296" r:id="rId10"/>
+    <p:sldId id="298" r:id="rId11"/>
+    <p:sldId id="299" r:id="rId12"/>
+    <p:sldId id="300" r:id="rId13"/>
     <p:sldId id="303" r:id="rId14"/>
   </p:sldIdLst>
   <p:sldSz cx="9144000" cy="5143500" type="screen16x9"/>
@@ -275,6 +275,97 @@
     </p:ext>
   </p:extLst>
 </p:presentation>
+</file>
+
+<file path=ppt/revisionInfo.xml><?xml version="1.0" encoding="utf-8"?>
+<p1510:revInfo xmlns:a="http://schemas.openxmlformats.org/drawingml/2006/main" xmlns:r="http://schemas.openxmlformats.org/officeDocument/2006/relationships" xmlns:p1510="http://schemas.microsoft.com/office/powerpoint/2015/10/main">
+  <p1510:revLst>
+    <p1510:client id="{31D176F3-10C5-48C3-8027-83F943D27627}" v="6" dt="2020-11-17T20:40:33.344"/>
+  </p1510:revLst>
+</p1510:revInfo>
+</file>
+
+<file path=ppt/changesInfos/changesInfo1.xml><?xml version="1.0" encoding="utf-8"?>
+<pc:chgInfo xmlns:a="http://schemas.openxmlformats.org/drawingml/2006/main" xmlns:r="http://schemas.openxmlformats.org/officeDocument/2006/relationships" xmlns:ac="http://schemas.microsoft.com/office/drawing/2013/main/command" xmlns:pc="http://schemas.microsoft.com/office/powerpoint/2013/main/command">
+  <pc:docChgLst>
+    <pc:chgData name="Yaroslav Brahinets" userId="21b0ef620fff3801" providerId="LiveId" clId="{31D176F3-10C5-48C3-8027-83F943D27627}"/>
+    <pc:docChg chg="custSel modSld sldOrd">
+      <pc:chgData name="Yaroslav Brahinets" userId="21b0ef620fff3801" providerId="LiveId" clId="{31D176F3-10C5-48C3-8027-83F943D27627}" dt="2020-11-17T20:40:33.344" v="30"/>
+      <pc:docMkLst>
+        <pc:docMk/>
+      </pc:docMkLst>
+      <pc:sldChg chg="addSp delSp modSp mod delAnim modAnim">
+        <pc:chgData name="Yaroslav Brahinets" userId="21b0ef620fff3801" providerId="LiveId" clId="{31D176F3-10C5-48C3-8027-83F943D27627}" dt="2020-11-17T20:40:33.344" v="30"/>
+        <pc:sldMkLst>
+          <pc:docMk/>
+          <pc:sldMk cId="3948495204" sldId="295"/>
+        </pc:sldMkLst>
+        <pc:picChg chg="add mod">
+          <ac:chgData name="Yaroslav Brahinets" userId="21b0ef620fff3801" providerId="LiveId" clId="{31D176F3-10C5-48C3-8027-83F943D27627}" dt="2020-11-17T20:34:53.619" v="7" actId="1076"/>
+          <ac:picMkLst>
+            <pc:docMk/>
+            <pc:sldMk cId="3948495204" sldId="295"/>
+            <ac:picMk id="3" creationId="{243DAA96-AE83-4DED-9327-C8DAC6FCA851}"/>
+          </ac:picMkLst>
+        </pc:picChg>
+        <pc:picChg chg="del">
+          <ac:chgData name="Yaroslav Brahinets" userId="21b0ef620fff3801" providerId="LiveId" clId="{31D176F3-10C5-48C3-8027-83F943D27627}" dt="2020-11-17T20:34:51.542" v="6" actId="478"/>
+          <ac:picMkLst>
+            <pc:docMk/>
+            <pc:sldMk cId="3948495204" sldId="295"/>
+            <ac:picMk id="12" creationId="{0498353A-8733-4BA1-9D4A-CA0E4674CC62}"/>
+          </ac:picMkLst>
+        </pc:picChg>
+      </pc:sldChg>
+      <pc:sldChg chg="addSp delSp modSp mod delAnim modAnim">
+        <pc:chgData name="Yaroslav Brahinets" userId="21b0ef620fff3801" providerId="LiveId" clId="{31D176F3-10C5-48C3-8027-83F943D27627}" dt="2020-11-17T20:39:30.545" v="25"/>
+        <pc:sldMkLst>
+          <pc:docMk/>
+          <pc:sldMk cId="2329200121" sldId="298"/>
+        </pc:sldMkLst>
+        <pc:picChg chg="add mod">
+          <ac:chgData name="Yaroslav Brahinets" userId="21b0ef620fff3801" providerId="LiveId" clId="{31D176F3-10C5-48C3-8027-83F943D27627}" dt="2020-11-17T20:39:22.503" v="22" actId="1076"/>
+          <ac:picMkLst>
+            <pc:docMk/>
+            <pc:sldMk cId="2329200121" sldId="298"/>
+            <ac:picMk id="3" creationId="{534D7FB9-543D-46DD-8F03-39F8B6A4B3F3}"/>
+          </ac:picMkLst>
+        </pc:picChg>
+        <pc:picChg chg="add mod">
+          <ac:chgData name="Yaroslav Brahinets" userId="21b0ef620fff3801" providerId="LiveId" clId="{31D176F3-10C5-48C3-8027-83F943D27627}" dt="2020-11-17T20:39:26.039" v="24" actId="14861"/>
+          <ac:picMkLst>
+            <pc:docMk/>
+            <pc:sldMk cId="2329200121" sldId="298"/>
+            <ac:picMk id="5" creationId="{30ABD9C1-4733-490C-8992-4E5995511790}"/>
+          </ac:picMkLst>
+        </pc:picChg>
+        <pc:picChg chg="del">
+          <ac:chgData name="Yaroslav Brahinets" userId="21b0ef620fff3801" providerId="LiveId" clId="{31D176F3-10C5-48C3-8027-83F943D27627}" dt="2020-11-17T20:38:13.560" v="12" actId="21"/>
+          <ac:picMkLst>
+            <pc:docMk/>
+            <pc:sldMk cId="2329200121" sldId="298"/>
+            <ac:picMk id="8" creationId="{6BF6D327-99F9-4675-BB8E-EFABB98B06F8}"/>
+          </ac:picMkLst>
+        </pc:picChg>
+        <pc:picChg chg="del">
+          <ac:chgData name="Yaroslav Brahinets" userId="21b0ef620fff3801" providerId="LiveId" clId="{31D176F3-10C5-48C3-8027-83F943D27627}" dt="2020-11-17T20:38:08.824" v="9" actId="478"/>
+          <ac:picMkLst>
+            <pc:docMk/>
+            <pc:sldMk cId="2329200121" sldId="298"/>
+            <ac:picMk id="12" creationId="{0498353A-8733-4BA1-9D4A-CA0E4674CC62}"/>
+          </ac:picMkLst>
+        </pc:picChg>
+      </pc:sldChg>
+      <pc:sldChg chg="ord">
+        <pc:chgData name="Yaroslav Brahinets" userId="21b0ef620fff3801" providerId="LiveId" clId="{31D176F3-10C5-48C3-8027-83F943D27627}" dt="2020-11-17T20:40:22.302" v="29"/>
+        <pc:sldMkLst>
+          <pc:docMk/>
+          <pc:sldMk cId="1738157829" sldId="301"/>
+        </pc:sldMkLst>
+      </pc:sldChg>
+    </pc:docChg>
+  </pc:docChgLst>
+</pc:chgInfo>
 </file>
 
 <file path=ppt/notesMasters/notesMaster1.xml><?xml version="1.0" encoding="utf-8"?>
@@ -3239,6 +3330,251 @@
           <p:cNvPr id="2" name="Title 1">
             <a:extLst>
               <a:ext uri="{FF2B5EF4-FFF2-40B4-BE49-F238E27FC236}">
+                <a16:creationId xmlns:a16="http://schemas.microsoft.com/office/drawing/2014/main" id="{8CC8A124-749C-4F8E-A2AC-FCAF54644DED}"/>
+              </a:ext>
+            </a:extLst>
+          </p:cNvPr>
+          <p:cNvSpPr>
+            <a:spLocks noGrp="1"/>
+          </p:cNvSpPr>
+          <p:nvPr>
+            <p:ph type="title"/>
+          </p:nvPr>
+        </p:nvSpPr>
+        <p:spPr/>
+        <p:txBody>
+          <a:bodyPr/>
+          <a:lstStyle/>
+          <a:p>
+            <a:r>
+              <a:rPr lang="en-US" b="1" dirty="0"/>
+              <a:t>Useless exception usage</a:t>
+            </a:r>
+          </a:p>
+        </p:txBody>
+      </p:sp>
+      <p:sp>
+        <p:nvSpPr>
+          <p:cNvPr id="4" name="Slide Number Placeholder 3">
+            <a:extLst>
+              <a:ext uri="{FF2B5EF4-FFF2-40B4-BE49-F238E27FC236}">
+                <a16:creationId xmlns:a16="http://schemas.microsoft.com/office/drawing/2014/main" id="{D11DABE8-3DA4-4A99-8169-F0975E280E8A}"/>
+              </a:ext>
+            </a:extLst>
+          </p:cNvPr>
+          <p:cNvSpPr>
+            <a:spLocks noGrp="1"/>
+          </p:cNvSpPr>
+          <p:nvPr>
+            <p:ph type="sldNum" idx="12"/>
+          </p:nvPr>
+        </p:nvSpPr>
+        <p:spPr/>
+        <p:txBody>
+          <a:bodyPr/>
+          <a:lstStyle/>
+          <a:p>
+            <a:pPr marL="0" lvl="0" indent="0" algn="r" rtl="0">
+              <a:spcBef>
+                <a:spcPts val="0"/>
+              </a:spcBef>
+              <a:spcAft>
+                <a:spcPts val="0"/>
+              </a:spcAft>
+              <a:buNone/>
+            </a:pPr>
+            <a:fld id="{00000000-1234-1234-1234-123412341234}" type="slidenum">
+              <a:rPr lang="en" smtClean="0"/>
+              <a:t>10</a:t>
+            </a:fld>
+            <a:endParaRPr lang="en"/>
+          </a:p>
+        </p:txBody>
+      </p:sp>
+      <p:pic>
+        <p:nvPicPr>
+          <p:cNvPr id="3" name="Picture 2">
+            <a:extLst>
+              <a:ext uri="{FF2B5EF4-FFF2-40B4-BE49-F238E27FC236}">
+                <a16:creationId xmlns:a16="http://schemas.microsoft.com/office/drawing/2014/main" id="{534D7FB9-543D-46DD-8F03-39F8B6A4B3F3}"/>
+              </a:ext>
+            </a:extLst>
+          </p:cNvPr>
+          <p:cNvPicPr>
+            <a:picLocks noChangeAspect="1"/>
+          </p:cNvPicPr>
+          <p:nvPr/>
+        </p:nvPicPr>
+        <p:blipFill>
+          <a:blip r:embed="rId2"/>
+          <a:stretch>
+            <a:fillRect/>
+          </a:stretch>
+        </p:blipFill>
+        <p:spPr>
+          <a:xfrm>
+            <a:off x="1268502" y="1358746"/>
+            <a:ext cx="6400375" cy="1722041"/>
+          </a:xfrm>
+          <a:prstGeom prst="rect">
+            <a:avLst/>
+          </a:prstGeom>
+          <a:effectLst>
+            <a:outerShdw blurRad="63500" sx="102000" sy="102000" algn="ctr" rotWithShape="0">
+              <a:srgbClr val="FF0000">
+                <a:alpha val="40000"/>
+              </a:srgbClr>
+            </a:outerShdw>
+          </a:effectLst>
+        </p:spPr>
+      </p:pic>
+      <p:pic>
+        <p:nvPicPr>
+          <p:cNvPr id="5" name="Picture 4">
+            <a:extLst>
+              <a:ext uri="{FF2B5EF4-FFF2-40B4-BE49-F238E27FC236}">
+                <a16:creationId xmlns:a16="http://schemas.microsoft.com/office/drawing/2014/main" id="{30ABD9C1-4733-490C-8992-4E5995511790}"/>
+              </a:ext>
+            </a:extLst>
+          </p:cNvPr>
+          <p:cNvPicPr>
+            <a:picLocks noChangeAspect="1"/>
+          </p:cNvPicPr>
+          <p:nvPr/>
+        </p:nvPicPr>
+        <p:blipFill>
+          <a:blip r:embed="rId3"/>
+          <a:stretch>
+            <a:fillRect/>
+          </a:stretch>
+        </p:blipFill>
+        <p:spPr>
+          <a:xfrm>
+            <a:off x="1475123" y="3223746"/>
+            <a:ext cx="6193754" cy="1648491"/>
+          </a:xfrm>
+          <a:prstGeom prst="rect">
+            <a:avLst/>
+          </a:prstGeom>
+          <a:effectLst>
+            <a:outerShdw blurRad="63500" sx="102000" sy="102000" algn="ctr" rotWithShape="0">
+              <a:srgbClr val="00B050">
+                <a:alpha val="40000"/>
+              </a:srgbClr>
+            </a:outerShdw>
+          </a:effectLst>
+        </p:spPr>
+      </p:pic>
+    </p:spTree>
+    <p:extLst>
+      <p:ext uri="{BB962C8B-B14F-4D97-AF65-F5344CB8AC3E}">
+        <p14:creationId xmlns:p14="http://schemas.microsoft.com/office/powerpoint/2010/main" val="2329200121"/>
+      </p:ext>
+    </p:extLst>
+  </p:cSld>
+  <p:clrMapOvr>
+    <a:masterClrMapping/>
+  </p:clrMapOvr>
+  <p:timing>
+    <p:tnLst>
+      <p:par>
+        <p:cTn id="1" dur="indefinite" restart="never" nodeType="tmRoot">
+          <p:childTnLst>
+            <p:seq concurrent="1" nextAc="seek">
+              <p:cTn id="2" dur="indefinite" nodeType="mainSeq">
+                <p:childTnLst>
+                  <p:par>
+                    <p:cTn id="3" fill="hold">
+                      <p:stCondLst>
+                        <p:cond delay="indefinite"/>
+                      </p:stCondLst>
+                      <p:childTnLst>
+                        <p:par>
+                          <p:cTn id="4" fill="hold">
+                            <p:stCondLst>
+                              <p:cond delay="0"/>
+                            </p:stCondLst>
+                            <p:childTnLst>
+                              <p:par>
+                                <p:cTn id="5" presetID="1" presetClass="entr" presetSubtype="0" fill="hold" nodeType="clickEffect">
+                                  <p:stCondLst>
+                                    <p:cond delay="0"/>
+                                  </p:stCondLst>
+                                  <p:childTnLst>
+                                    <p:set>
+                                      <p:cBhvr>
+                                        <p:cTn id="6" dur="1" fill="hold">
+                                          <p:stCondLst>
+                                            <p:cond delay="0"/>
+                                          </p:stCondLst>
+                                        </p:cTn>
+                                        <p:tgtEl>
+                                          <p:spTgt spid="5"/>
+                                        </p:tgtEl>
+                                        <p:attrNameLst>
+                                          <p:attrName>style.visibility</p:attrName>
+                                        </p:attrNameLst>
+                                      </p:cBhvr>
+                                      <p:to>
+                                        <p:strVal val="visible"/>
+                                      </p:to>
+                                    </p:set>
+                                  </p:childTnLst>
+                                </p:cTn>
+                              </p:par>
+                            </p:childTnLst>
+                          </p:cTn>
+                        </p:par>
+                      </p:childTnLst>
+                    </p:cTn>
+                  </p:par>
+                </p:childTnLst>
+              </p:cTn>
+              <p:prevCondLst>
+                <p:cond evt="onPrev" delay="0">
+                  <p:tgtEl>
+                    <p:sldTgt/>
+                  </p:tgtEl>
+                </p:cond>
+              </p:prevCondLst>
+              <p:nextCondLst>
+                <p:cond evt="onNext" delay="0">
+                  <p:tgtEl>
+                    <p:sldTgt/>
+                  </p:tgtEl>
+                </p:cond>
+              </p:nextCondLst>
+            </p:seq>
+          </p:childTnLst>
+        </p:cTn>
+      </p:par>
+    </p:tnLst>
+  </p:timing>
+</p:sld>
+</file>
+
+<file path=ppt/slides/slide11.xml><?xml version="1.0" encoding="utf-8"?>
+<p:sld xmlns:a="http://schemas.openxmlformats.org/drawingml/2006/main" xmlns:r="http://schemas.openxmlformats.org/officeDocument/2006/relationships" xmlns:p="http://schemas.openxmlformats.org/presentationml/2006/main">
+  <p:cSld>
+    <p:spTree>
+      <p:nvGrpSpPr>
+        <p:cNvPr id="1" name=""/>
+        <p:cNvGrpSpPr/>
+        <p:nvPr/>
+      </p:nvGrpSpPr>
+      <p:grpSpPr>
+        <a:xfrm>
+          <a:off x="0" y="0"/>
+          <a:ext cx="0" cy="0"/>
+          <a:chOff x="0" y="0"/>
+          <a:chExt cx="0" cy="0"/>
+        </a:xfrm>
+      </p:grpSpPr>
+      <p:sp>
+        <p:nvSpPr>
+          <p:cNvPr id="2" name="Title 1">
+            <a:extLst>
+              <a:ext uri="{FF2B5EF4-FFF2-40B4-BE49-F238E27FC236}">
                 <a16:creationId xmlns:a16="http://schemas.microsoft.com/office/drawing/2014/main" id="{91343F51-224F-48A5-ACEC-2D205F7D68CA}"/>
               </a:ext>
             </a:extLst>
@@ -3294,7 +3630,7 @@
             </a:pPr>
             <a:fld id="{00000000-1234-1234-1234-123412341234}" type="slidenum">
               <a:rPr lang="en" smtClean="0"/>
-              <a:t>10</a:t>
+              <a:t>11</a:t>
             </a:fld>
             <a:endParaRPr lang="en"/>
           </a:p>
@@ -3499,7 +3835,7 @@
 </p:sld>
 </file>
 
-<file path=ppt/slides/slide11.xml><?xml version="1.0" encoding="utf-8"?>
+<file path=ppt/slides/slide12.xml><?xml version="1.0" encoding="utf-8"?>
 <p:sld xmlns:a="http://schemas.openxmlformats.org/drawingml/2006/main" xmlns:r="http://schemas.openxmlformats.org/officeDocument/2006/relationships" xmlns:p="http://schemas.openxmlformats.org/presentationml/2006/main">
   <p:cSld>
     <p:spTree>
@@ -3613,7 +3949,7 @@
             </a:pPr>
             <a:fld id="{00000000-1234-1234-1234-123412341234}" type="slidenum">
               <a:rPr lang="en" smtClean="0"/>
-              <a:t>11</a:t>
+              <a:t>12</a:t>
             </a:fld>
             <a:endParaRPr lang="en"/>
           </a:p>
@@ -3738,251 +4074,6 @@
                                         </p:cTn>
                                         <p:tgtEl>
                                           <p:spTgt spid="6"/>
-                                        </p:tgtEl>
-                                        <p:attrNameLst>
-                                          <p:attrName>style.visibility</p:attrName>
-                                        </p:attrNameLst>
-                                      </p:cBhvr>
-                                      <p:to>
-                                        <p:strVal val="visible"/>
-                                      </p:to>
-                                    </p:set>
-                                  </p:childTnLst>
-                                </p:cTn>
-                              </p:par>
-                            </p:childTnLst>
-                          </p:cTn>
-                        </p:par>
-                      </p:childTnLst>
-                    </p:cTn>
-                  </p:par>
-                </p:childTnLst>
-              </p:cTn>
-              <p:prevCondLst>
-                <p:cond evt="onPrev" delay="0">
-                  <p:tgtEl>
-                    <p:sldTgt/>
-                  </p:tgtEl>
-                </p:cond>
-              </p:prevCondLst>
-              <p:nextCondLst>
-                <p:cond evt="onNext" delay="0">
-                  <p:tgtEl>
-                    <p:sldTgt/>
-                  </p:tgtEl>
-                </p:cond>
-              </p:nextCondLst>
-            </p:seq>
-          </p:childTnLst>
-        </p:cTn>
-      </p:par>
-    </p:tnLst>
-  </p:timing>
-</p:sld>
-</file>
-
-<file path=ppt/slides/slide12.xml><?xml version="1.0" encoding="utf-8"?>
-<p:sld xmlns:a="http://schemas.openxmlformats.org/drawingml/2006/main" xmlns:r="http://schemas.openxmlformats.org/officeDocument/2006/relationships" xmlns:p="http://schemas.openxmlformats.org/presentationml/2006/main">
-  <p:cSld>
-    <p:spTree>
-      <p:nvGrpSpPr>
-        <p:cNvPr id="1" name=""/>
-        <p:cNvGrpSpPr/>
-        <p:nvPr/>
-      </p:nvGrpSpPr>
-      <p:grpSpPr>
-        <a:xfrm>
-          <a:off x="0" y="0"/>
-          <a:ext cx="0" cy="0"/>
-          <a:chOff x="0" y="0"/>
-          <a:chExt cx="0" cy="0"/>
-        </a:xfrm>
-      </p:grpSpPr>
-      <p:sp>
-        <p:nvSpPr>
-          <p:cNvPr id="2" name="Title 1">
-            <a:extLst>
-              <a:ext uri="{FF2B5EF4-FFF2-40B4-BE49-F238E27FC236}">
-                <a16:creationId xmlns:a16="http://schemas.microsoft.com/office/drawing/2014/main" id="{F910ED0D-CD0A-4AC7-9BAA-16E2E4F2D1C0}"/>
-              </a:ext>
-            </a:extLst>
-          </p:cNvPr>
-          <p:cNvSpPr>
-            <a:spLocks noGrp="1"/>
-          </p:cNvSpPr>
-          <p:nvPr>
-            <p:ph type="title"/>
-          </p:nvPr>
-        </p:nvSpPr>
-        <p:spPr/>
-        <p:txBody>
-          <a:bodyPr/>
-          <a:lstStyle/>
-          <a:p>
-            <a:r>
-              <a:rPr lang="en-US" dirty="0"/>
-              <a:t>Handle edge cases</a:t>
-            </a:r>
-          </a:p>
-        </p:txBody>
-      </p:sp>
-      <p:sp>
-        <p:nvSpPr>
-          <p:cNvPr id="4" name="Slide Number Placeholder 3">
-            <a:extLst>
-              <a:ext uri="{FF2B5EF4-FFF2-40B4-BE49-F238E27FC236}">
-                <a16:creationId xmlns:a16="http://schemas.microsoft.com/office/drawing/2014/main" id="{41BADB0C-A4D5-4188-B565-326455E87996}"/>
-              </a:ext>
-            </a:extLst>
-          </p:cNvPr>
-          <p:cNvSpPr>
-            <a:spLocks noGrp="1"/>
-          </p:cNvSpPr>
-          <p:nvPr>
-            <p:ph type="sldNum" idx="12"/>
-          </p:nvPr>
-        </p:nvSpPr>
-        <p:spPr/>
-        <p:txBody>
-          <a:bodyPr/>
-          <a:lstStyle/>
-          <a:p>
-            <a:pPr marL="0" lvl="0" indent="0" algn="r" rtl="0">
-              <a:spcBef>
-                <a:spcPts val="0"/>
-              </a:spcBef>
-              <a:spcAft>
-                <a:spcPts val="0"/>
-              </a:spcAft>
-              <a:buNone/>
-            </a:pPr>
-            <a:fld id="{00000000-1234-1234-1234-123412341234}" type="slidenum">
-              <a:rPr lang="en" smtClean="0"/>
-              <a:t>12</a:t>
-            </a:fld>
-            <a:endParaRPr lang="en"/>
-          </a:p>
-        </p:txBody>
-      </p:sp>
-      <p:pic>
-        <p:nvPicPr>
-          <p:cNvPr id="6" name="Picture 5">
-            <a:extLst>
-              <a:ext uri="{FF2B5EF4-FFF2-40B4-BE49-F238E27FC236}">
-                <a16:creationId xmlns:a16="http://schemas.microsoft.com/office/drawing/2014/main" id="{6FA11136-143C-414E-92B1-586F12F57CD1}"/>
-              </a:ext>
-            </a:extLst>
-          </p:cNvPr>
-          <p:cNvPicPr>
-            <a:picLocks noChangeAspect="1"/>
-          </p:cNvPicPr>
-          <p:nvPr/>
-        </p:nvPicPr>
-        <p:blipFill>
-          <a:blip r:embed="rId2"/>
-          <a:stretch>
-            <a:fillRect/>
-          </a:stretch>
-        </p:blipFill>
-        <p:spPr>
-          <a:xfrm>
-            <a:off x="893701" y="1710813"/>
-            <a:ext cx="2179286" cy="2415988"/>
-          </a:xfrm>
-          <a:prstGeom prst="rect">
-            <a:avLst/>
-          </a:prstGeom>
-          <a:effectLst>
-            <a:outerShdw blurRad="63500" sx="102000" sy="102000" algn="ctr" rotWithShape="0">
-              <a:srgbClr val="FF0000">
-                <a:alpha val="40000"/>
-              </a:srgbClr>
-            </a:outerShdw>
-          </a:effectLst>
-        </p:spPr>
-      </p:pic>
-      <p:pic>
-        <p:nvPicPr>
-          <p:cNvPr id="8" name="Picture 7">
-            <a:extLst>
-              <a:ext uri="{FF2B5EF4-FFF2-40B4-BE49-F238E27FC236}">
-                <a16:creationId xmlns:a16="http://schemas.microsoft.com/office/drawing/2014/main" id="{8B60E93E-F723-4195-99ED-C0397F99270B}"/>
-              </a:ext>
-            </a:extLst>
-          </p:cNvPr>
-          <p:cNvPicPr>
-            <a:picLocks noChangeAspect="1"/>
-          </p:cNvPicPr>
-          <p:nvPr/>
-        </p:nvPicPr>
-        <p:blipFill>
-          <a:blip r:embed="rId3"/>
-          <a:stretch>
-            <a:fillRect/>
-          </a:stretch>
-        </p:blipFill>
-        <p:spPr>
-          <a:xfrm>
-            <a:off x="3753465" y="1623541"/>
-            <a:ext cx="5168903" cy="2634824"/>
-          </a:xfrm>
-          <a:prstGeom prst="rect">
-            <a:avLst/>
-          </a:prstGeom>
-          <a:effectLst>
-            <a:outerShdw blurRad="63500" sx="102000" sy="102000" algn="ctr" rotWithShape="0">
-              <a:srgbClr val="00B050">
-                <a:alpha val="40000"/>
-              </a:srgbClr>
-            </a:outerShdw>
-          </a:effectLst>
-        </p:spPr>
-      </p:pic>
-    </p:spTree>
-    <p:extLst>
-      <p:ext uri="{BB962C8B-B14F-4D97-AF65-F5344CB8AC3E}">
-        <p14:creationId xmlns:p14="http://schemas.microsoft.com/office/powerpoint/2010/main" val="1738157829"/>
-      </p:ext>
-    </p:extLst>
-  </p:cSld>
-  <p:clrMapOvr>
-    <a:masterClrMapping/>
-  </p:clrMapOvr>
-  <p:timing>
-    <p:tnLst>
-      <p:par>
-        <p:cTn id="1" dur="indefinite" restart="never" nodeType="tmRoot">
-          <p:childTnLst>
-            <p:seq concurrent="1" nextAc="seek">
-              <p:cTn id="2" dur="indefinite" nodeType="mainSeq">
-                <p:childTnLst>
-                  <p:par>
-                    <p:cTn id="3" fill="hold">
-                      <p:stCondLst>
-                        <p:cond delay="indefinite"/>
-                      </p:stCondLst>
-                      <p:childTnLst>
-                        <p:par>
-                          <p:cTn id="4" fill="hold">
-                            <p:stCondLst>
-                              <p:cond delay="0"/>
-                            </p:stCondLst>
-                            <p:childTnLst>
-                              <p:par>
-                                <p:cTn id="5" presetID="1" presetClass="entr" presetSubtype="0" fill="hold" nodeType="clickEffect">
-                                  <p:stCondLst>
-                                    <p:cond delay="0"/>
-                                  </p:stCondLst>
-                                  <p:childTnLst>
-                                    <p:set>
-                                      <p:cBhvr>
-                                        <p:cTn id="6" dur="1" fill="hold">
-                                          <p:stCondLst>
-                                            <p:cond delay="0"/>
-                                          </p:stCondLst>
-                                        </p:cTn>
-                                        <p:tgtEl>
-                                          <p:spTgt spid="8"/>
                                         </p:tgtEl>
                                         <p:attrNameLst>
                                           <p:attrName>style.visibility</p:attrName>
@@ -5402,6 +5493,251 @@
           <p:cNvPr id="2" name="Title 1">
             <a:extLst>
               <a:ext uri="{FF2B5EF4-FFF2-40B4-BE49-F238E27FC236}">
+                <a16:creationId xmlns:a16="http://schemas.microsoft.com/office/drawing/2014/main" id="{F910ED0D-CD0A-4AC7-9BAA-16E2E4F2D1C0}"/>
+              </a:ext>
+            </a:extLst>
+          </p:cNvPr>
+          <p:cNvSpPr>
+            <a:spLocks noGrp="1"/>
+          </p:cNvSpPr>
+          <p:nvPr>
+            <p:ph type="title"/>
+          </p:nvPr>
+        </p:nvSpPr>
+        <p:spPr/>
+        <p:txBody>
+          <a:bodyPr/>
+          <a:lstStyle/>
+          <a:p>
+            <a:r>
+              <a:rPr lang="en-US" dirty="0"/>
+              <a:t>Handle edge cases</a:t>
+            </a:r>
+          </a:p>
+        </p:txBody>
+      </p:sp>
+      <p:sp>
+        <p:nvSpPr>
+          <p:cNvPr id="4" name="Slide Number Placeholder 3">
+            <a:extLst>
+              <a:ext uri="{FF2B5EF4-FFF2-40B4-BE49-F238E27FC236}">
+                <a16:creationId xmlns:a16="http://schemas.microsoft.com/office/drawing/2014/main" id="{41BADB0C-A4D5-4188-B565-326455E87996}"/>
+              </a:ext>
+            </a:extLst>
+          </p:cNvPr>
+          <p:cNvSpPr>
+            <a:spLocks noGrp="1"/>
+          </p:cNvSpPr>
+          <p:nvPr>
+            <p:ph type="sldNum" idx="12"/>
+          </p:nvPr>
+        </p:nvSpPr>
+        <p:spPr/>
+        <p:txBody>
+          <a:bodyPr/>
+          <a:lstStyle/>
+          <a:p>
+            <a:pPr marL="0" lvl="0" indent="0" algn="r" rtl="0">
+              <a:spcBef>
+                <a:spcPts val="0"/>
+              </a:spcBef>
+              <a:spcAft>
+                <a:spcPts val="0"/>
+              </a:spcAft>
+              <a:buNone/>
+            </a:pPr>
+            <a:fld id="{00000000-1234-1234-1234-123412341234}" type="slidenum">
+              <a:rPr lang="en" smtClean="0"/>
+              <a:t>6</a:t>
+            </a:fld>
+            <a:endParaRPr lang="en"/>
+          </a:p>
+        </p:txBody>
+      </p:sp>
+      <p:pic>
+        <p:nvPicPr>
+          <p:cNvPr id="6" name="Picture 5">
+            <a:extLst>
+              <a:ext uri="{FF2B5EF4-FFF2-40B4-BE49-F238E27FC236}">
+                <a16:creationId xmlns:a16="http://schemas.microsoft.com/office/drawing/2014/main" id="{6FA11136-143C-414E-92B1-586F12F57CD1}"/>
+              </a:ext>
+            </a:extLst>
+          </p:cNvPr>
+          <p:cNvPicPr>
+            <a:picLocks noChangeAspect="1"/>
+          </p:cNvPicPr>
+          <p:nvPr/>
+        </p:nvPicPr>
+        <p:blipFill>
+          <a:blip r:embed="rId2"/>
+          <a:stretch>
+            <a:fillRect/>
+          </a:stretch>
+        </p:blipFill>
+        <p:spPr>
+          <a:xfrm>
+            <a:off x="893701" y="1710813"/>
+            <a:ext cx="2179286" cy="2415988"/>
+          </a:xfrm>
+          <a:prstGeom prst="rect">
+            <a:avLst/>
+          </a:prstGeom>
+          <a:effectLst>
+            <a:outerShdw blurRad="63500" sx="102000" sy="102000" algn="ctr" rotWithShape="0">
+              <a:srgbClr val="FF0000">
+                <a:alpha val="40000"/>
+              </a:srgbClr>
+            </a:outerShdw>
+          </a:effectLst>
+        </p:spPr>
+      </p:pic>
+      <p:pic>
+        <p:nvPicPr>
+          <p:cNvPr id="8" name="Picture 7">
+            <a:extLst>
+              <a:ext uri="{FF2B5EF4-FFF2-40B4-BE49-F238E27FC236}">
+                <a16:creationId xmlns:a16="http://schemas.microsoft.com/office/drawing/2014/main" id="{8B60E93E-F723-4195-99ED-C0397F99270B}"/>
+              </a:ext>
+            </a:extLst>
+          </p:cNvPr>
+          <p:cNvPicPr>
+            <a:picLocks noChangeAspect="1"/>
+          </p:cNvPicPr>
+          <p:nvPr/>
+        </p:nvPicPr>
+        <p:blipFill>
+          <a:blip r:embed="rId3"/>
+          <a:stretch>
+            <a:fillRect/>
+          </a:stretch>
+        </p:blipFill>
+        <p:spPr>
+          <a:xfrm>
+            <a:off x="3753465" y="1623541"/>
+            <a:ext cx="5168903" cy="2634824"/>
+          </a:xfrm>
+          <a:prstGeom prst="rect">
+            <a:avLst/>
+          </a:prstGeom>
+          <a:effectLst>
+            <a:outerShdw blurRad="63500" sx="102000" sy="102000" algn="ctr" rotWithShape="0">
+              <a:srgbClr val="00B050">
+                <a:alpha val="40000"/>
+              </a:srgbClr>
+            </a:outerShdw>
+          </a:effectLst>
+        </p:spPr>
+      </p:pic>
+    </p:spTree>
+    <p:extLst>
+      <p:ext uri="{BB962C8B-B14F-4D97-AF65-F5344CB8AC3E}">
+        <p14:creationId xmlns:p14="http://schemas.microsoft.com/office/powerpoint/2010/main" val="1738157829"/>
+      </p:ext>
+    </p:extLst>
+  </p:cSld>
+  <p:clrMapOvr>
+    <a:masterClrMapping/>
+  </p:clrMapOvr>
+  <p:timing>
+    <p:tnLst>
+      <p:par>
+        <p:cTn id="1" dur="indefinite" restart="never" nodeType="tmRoot">
+          <p:childTnLst>
+            <p:seq concurrent="1" nextAc="seek">
+              <p:cTn id="2" dur="indefinite" nodeType="mainSeq">
+                <p:childTnLst>
+                  <p:par>
+                    <p:cTn id="3" fill="hold">
+                      <p:stCondLst>
+                        <p:cond delay="indefinite"/>
+                      </p:stCondLst>
+                      <p:childTnLst>
+                        <p:par>
+                          <p:cTn id="4" fill="hold">
+                            <p:stCondLst>
+                              <p:cond delay="0"/>
+                            </p:stCondLst>
+                            <p:childTnLst>
+                              <p:par>
+                                <p:cTn id="5" presetID="1" presetClass="entr" presetSubtype="0" fill="hold" nodeType="clickEffect">
+                                  <p:stCondLst>
+                                    <p:cond delay="0"/>
+                                  </p:stCondLst>
+                                  <p:childTnLst>
+                                    <p:set>
+                                      <p:cBhvr>
+                                        <p:cTn id="6" dur="1" fill="hold">
+                                          <p:stCondLst>
+                                            <p:cond delay="0"/>
+                                          </p:stCondLst>
+                                        </p:cTn>
+                                        <p:tgtEl>
+                                          <p:spTgt spid="8"/>
+                                        </p:tgtEl>
+                                        <p:attrNameLst>
+                                          <p:attrName>style.visibility</p:attrName>
+                                        </p:attrNameLst>
+                                      </p:cBhvr>
+                                      <p:to>
+                                        <p:strVal val="visible"/>
+                                      </p:to>
+                                    </p:set>
+                                  </p:childTnLst>
+                                </p:cTn>
+                              </p:par>
+                            </p:childTnLst>
+                          </p:cTn>
+                        </p:par>
+                      </p:childTnLst>
+                    </p:cTn>
+                  </p:par>
+                </p:childTnLst>
+              </p:cTn>
+              <p:prevCondLst>
+                <p:cond evt="onPrev" delay="0">
+                  <p:tgtEl>
+                    <p:sldTgt/>
+                  </p:tgtEl>
+                </p:cond>
+              </p:prevCondLst>
+              <p:nextCondLst>
+                <p:cond evt="onNext" delay="0">
+                  <p:tgtEl>
+                    <p:sldTgt/>
+                  </p:tgtEl>
+                </p:cond>
+              </p:nextCondLst>
+            </p:seq>
+          </p:childTnLst>
+        </p:cTn>
+      </p:par>
+    </p:tnLst>
+  </p:timing>
+</p:sld>
+</file>
+
+<file path=ppt/slides/slide7.xml><?xml version="1.0" encoding="utf-8"?>
+<p:sld xmlns:a="http://schemas.openxmlformats.org/drawingml/2006/main" xmlns:r="http://schemas.openxmlformats.org/officeDocument/2006/relationships" xmlns:p="http://schemas.openxmlformats.org/presentationml/2006/main">
+  <p:cSld>
+    <p:spTree>
+      <p:nvGrpSpPr>
+        <p:cNvPr id="1" name=""/>
+        <p:cNvGrpSpPr/>
+        <p:nvPr/>
+      </p:nvGrpSpPr>
+      <p:grpSpPr>
+        <a:xfrm>
+          <a:off x="0" y="0"/>
+          <a:ext cx="0" cy="0"/>
+          <a:chOff x="0" y="0"/>
+          <a:chExt cx="0" cy="0"/>
+        </a:xfrm>
+      </p:grpSpPr>
+      <p:sp>
+        <p:nvSpPr>
+          <p:cNvPr id="2" name="Title 1">
+            <a:extLst>
+              <a:ext uri="{FF2B5EF4-FFF2-40B4-BE49-F238E27FC236}">
                 <a16:creationId xmlns:a16="http://schemas.microsoft.com/office/drawing/2014/main" id="{8CFA2A35-4A0A-4D9A-AFA9-F3885BFCF3A1}"/>
               </a:ext>
             </a:extLst>
@@ -5462,7 +5798,7 @@
             </a:pPr>
             <a:fld id="{00000000-1234-1234-1234-123412341234}" type="slidenum">
               <a:rPr lang="en" smtClean="0"/>
-              <a:t>6</a:t>
+              <a:t>7</a:t>
             </a:fld>
             <a:endParaRPr lang="en"/>
           </a:p>
@@ -5630,7 +5966,7 @@
 </p:sld>
 </file>
 
-<file path=ppt/slides/slide7.xml><?xml version="1.0" encoding="utf-8"?>
+<file path=ppt/slides/slide8.xml><?xml version="1.0" encoding="utf-8"?>
 <p:sld xmlns:a="http://schemas.openxmlformats.org/drawingml/2006/main" xmlns:r="http://schemas.openxmlformats.org/officeDocument/2006/relationships" xmlns:p="http://schemas.openxmlformats.org/presentationml/2006/main">
   <p:cSld>
     <p:spTree>
@@ -5707,7 +6043,7 @@
             </a:pPr>
             <a:fld id="{00000000-1234-1234-1234-123412341234}" type="slidenum">
               <a:rPr lang="en" smtClean="0"/>
-              <a:t>7</a:t>
+              <a:t>8</a:t>
             </a:fld>
             <a:endParaRPr lang="en"/>
           </a:p>
@@ -5752,10 +6088,10 @@
       </p:pic>
       <p:pic>
         <p:nvPicPr>
-          <p:cNvPr id="12" name="Picture 11" descr="Text&#10;&#10;Description automatically generated">
+          <p:cNvPr id="13" name="Picture 12">
             <a:extLst>
               <a:ext uri="{FF2B5EF4-FFF2-40B4-BE49-F238E27FC236}">
-                <a16:creationId xmlns:a16="http://schemas.microsoft.com/office/drawing/2014/main" id="{0498353A-8733-4BA1-9D4A-CA0E4674CC62}"/>
+                <a16:creationId xmlns:a16="http://schemas.microsoft.com/office/drawing/2014/main" id="{E6A133C1-8E8B-4DB7-B2EE-CDD66141CD2A}"/>
               </a:ext>
             </a:extLst>
           </p:cNvPr>
@@ -5772,15 +6108,15 @@
         </p:blipFill>
         <p:spPr>
           <a:xfrm>
-            <a:off x="990033" y="3672152"/>
-            <a:ext cx="7893925" cy="1212723"/>
+            <a:off x="2337484" y="2142952"/>
+            <a:ext cx="4469031" cy="428798"/>
           </a:xfrm>
           <a:prstGeom prst="rect">
             <a:avLst/>
           </a:prstGeom>
           <a:effectLst>
             <a:outerShdw blurRad="63500" sx="102000" sy="102000" algn="ctr" rotWithShape="0">
-              <a:srgbClr val="00B050">
+              <a:srgbClr val="FF0000">
                 <a:alpha val="40000"/>
               </a:srgbClr>
             </a:outerShdw>
@@ -5789,10 +6125,10 @@
       </p:pic>
       <p:pic>
         <p:nvPicPr>
-          <p:cNvPr id="13" name="Picture 12">
+          <p:cNvPr id="3" name="Picture 2">
             <a:extLst>
               <a:ext uri="{FF2B5EF4-FFF2-40B4-BE49-F238E27FC236}">
-                <a16:creationId xmlns:a16="http://schemas.microsoft.com/office/drawing/2014/main" id="{E6A133C1-8E8B-4DB7-B2EE-CDD66141CD2A}"/>
+                <a16:creationId xmlns:a16="http://schemas.microsoft.com/office/drawing/2014/main" id="{243DAA96-AE83-4DED-9327-C8DAC6FCA851}"/>
               </a:ext>
             </a:extLst>
           </p:cNvPr>
@@ -5809,15 +6145,15 @@
         </p:blipFill>
         <p:spPr>
           <a:xfrm>
-            <a:off x="2337484" y="2142952"/>
-            <a:ext cx="4469031" cy="428798"/>
+            <a:off x="625036" y="3561704"/>
+            <a:ext cx="7893926" cy="850842"/>
           </a:xfrm>
           <a:prstGeom prst="rect">
             <a:avLst/>
           </a:prstGeom>
           <a:effectLst>
             <a:outerShdw blurRad="63500" sx="102000" sy="102000" algn="ctr" rotWithShape="0">
-              <a:srgbClr val="FF0000">
+              <a:srgbClr val="00B050">
                 <a:alpha val="40000"/>
               </a:srgbClr>
             </a:outerShdw>
@@ -5868,52 +6204,7 @@
                                           </p:stCondLst>
                                         </p:cTn>
                                         <p:tgtEl>
-                                          <p:spTgt spid="13"/>
-                                        </p:tgtEl>
-                                        <p:attrNameLst>
-                                          <p:attrName>style.visibility</p:attrName>
-                                        </p:attrNameLst>
-                                      </p:cBhvr>
-                                      <p:to>
-                                        <p:strVal val="visible"/>
-                                      </p:to>
-                                    </p:set>
-                                  </p:childTnLst>
-                                </p:cTn>
-                              </p:par>
-                            </p:childTnLst>
-                          </p:cTn>
-                        </p:par>
-                      </p:childTnLst>
-                    </p:cTn>
-                  </p:par>
-                  <p:par>
-                    <p:cTn id="7" fill="hold">
-                      <p:stCondLst>
-                        <p:cond delay="indefinite"/>
-                      </p:stCondLst>
-                      <p:childTnLst>
-                        <p:par>
-                          <p:cTn id="8" fill="hold">
-                            <p:stCondLst>
-                              <p:cond delay="0"/>
-                            </p:stCondLst>
-                            <p:childTnLst>
-                              <p:par>
-                                <p:cTn id="9" presetID="1" presetClass="entr" presetSubtype="0" fill="hold" nodeType="clickEffect">
-                                  <p:stCondLst>
-                                    <p:cond delay="0"/>
-                                  </p:stCondLst>
-                                  <p:childTnLst>
-                                    <p:set>
-                                      <p:cBhvr>
-                                        <p:cTn id="10" dur="1" fill="hold">
-                                          <p:stCondLst>
-                                            <p:cond delay="0"/>
-                                          </p:stCondLst>
-                                        </p:cTn>
-                                        <p:tgtEl>
-                                          <p:spTgt spid="12"/>
+                                          <p:spTgt spid="3"/>
                                         </p:tgtEl>
                                         <p:attrNameLst>
                                           <p:attrName>style.visibility</p:attrName>
@@ -5957,7 +6248,7 @@
 </p:sld>
 </file>
 
-<file path=ppt/slides/slide8.xml><?xml version="1.0" encoding="utf-8"?>
+<file path=ppt/slides/slide9.xml><?xml version="1.0" encoding="utf-8"?>
 <p:sld xmlns:a="http://schemas.openxmlformats.org/drawingml/2006/main" xmlns:r="http://schemas.openxmlformats.org/officeDocument/2006/relationships" xmlns:p="http://schemas.openxmlformats.org/presentationml/2006/main">
   <p:cSld>
     <p:spTree>
@@ -6049,7 +6340,7 @@
             </a:pPr>
             <a:fld id="{00000000-1234-1234-1234-123412341234}" type="slidenum">
               <a:rPr lang="en" smtClean="0"/>
-              <a:t>8</a:t>
+              <a:t>9</a:t>
             </a:fld>
             <a:endParaRPr lang="en"/>
           </a:p>
@@ -6250,251 +6541,6 @@
                                     <p:set>
                                       <p:cBhvr>
                                         <p:cTn id="10" dur="1" fill="hold">
-                                          <p:stCondLst>
-                                            <p:cond delay="0"/>
-                                          </p:stCondLst>
-                                        </p:cTn>
-                                        <p:tgtEl>
-                                          <p:spTgt spid="12"/>
-                                        </p:tgtEl>
-                                        <p:attrNameLst>
-                                          <p:attrName>style.visibility</p:attrName>
-                                        </p:attrNameLst>
-                                      </p:cBhvr>
-                                      <p:to>
-                                        <p:strVal val="visible"/>
-                                      </p:to>
-                                    </p:set>
-                                  </p:childTnLst>
-                                </p:cTn>
-                              </p:par>
-                            </p:childTnLst>
-                          </p:cTn>
-                        </p:par>
-                      </p:childTnLst>
-                    </p:cTn>
-                  </p:par>
-                </p:childTnLst>
-              </p:cTn>
-              <p:prevCondLst>
-                <p:cond evt="onPrev" delay="0">
-                  <p:tgtEl>
-                    <p:sldTgt/>
-                  </p:tgtEl>
-                </p:cond>
-              </p:prevCondLst>
-              <p:nextCondLst>
-                <p:cond evt="onNext" delay="0">
-                  <p:tgtEl>
-                    <p:sldTgt/>
-                  </p:tgtEl>
-                </p:cond>
-              </p:nextCondLst>
-            </p:seq>
-          </p:childTnLst>
-        </p:cTn>
-      </p:par>
-    </p:tnLst>
-  </p:timing>
-</p:sld>
-</file>
-
-<file path=ppt/slides/slide9.xml><?xml version="1.0" encoding="utf-8"?>
-<p:sld xmlns:a="http://schemas.openxmlformats.org/drawingml/2006/main" xmlns:r="http://schemas.openxmlformats.org/officeDocument/2006/relationships" xmlns:p="http://schemas.openxmlformats.org/presentationml/2006/main">
-  <p:cSld>
-    <p:spTree>
-      <p:nvGrpSpPr>
-        <p:cNvPr id="1" name=""/>
-        <p:cNvGrpSpPr/>
-        <p:nvPr/>
-      </p:nvGrpSpPr>
-      <p:grpSpPr>
-        <a:xfrm>
-          <a:off x="0" y="0"/>
-          <a:ext cx="0" cy="0"/>
-          <a:chOff x="0" y="0"/>
-          <a:chExt cx="0" cy="0"/>
-        </a:xfrm>
-      </p:grpSpPr>
-      <p:sp>
-        <p:nvSpPr>
-          <p:cNvPr id="2" name="Title 1">
-            <a:extLst>
-              <a:ext uri="{FF2B5EF4-FFF2-40B4-BE49-F238E27FC236}">
-                <a16:creationId xmlns:a16="http://schemas.microsoft.com/office/drawing/2014/main" id="{8CC8A124-749C-4F8E-A2AC-FCAF54644DED}"/>
-              </a:ext>
-            </a:extLst>
-          </p:cNvPr>
-          <p:cNvSpPr>
-            <a:spLocks noGrp="1"/>
-          </p:cNvSpPr>
-          <p:nvPr>
-            <p:ph type="title"/>
-          </p:nvPr>
-        </p:nvSpPr>
-        <p:spPr/>
-        <p:txBody>
-          <a:bodyPr/>
-          <a:lstStyle/>
-          <a:p>
-            <a:r>
-              <a:rPr lang="en-US" b="1" dirty="0"/>
-              <a:t>Useless exception usage</a:t>
-            </a:r>
-          </a:p>
-        </p:txBody>
-      </p:sp>
-      <p:sp>
-        <p:nvSpPr>
-          <p:cNvPr id="4" name="Slide Number Placeholder 3">
-            <a:extLst>
-              <a:ext uri="{FF2B5EF4-FFF2-40B4-BE49-F238E27FC236}">
-                <a16:creationId xmlns:a16="http://schemas.microsoft.com/office/drawing/2014/main" id="{D11DABE8-3DA4-4A99-8169-F0975E280E8A}"/>
-              </a:ext>
-            </a:extLst>
-          </p:cNvPr>
-          <p:cNvSpPr>
-            <a:spLocks noGrp="1"/>
-          </p:cNvSpPr>
-          <p:nvPr>
-            <p:ph type="sldNum" idx="12"/>
-          </p:nvPr>
-        </p:nvSpPr>
-        <p:spPr/>
-        <p:txBody>
-          <a:bodyPr/>
-          <a:lstStyle/>
-          <a:p>
-            <a:pPr marL="0" lvl="0" indent="0" algn="r" rtl="0">
-              <a:spcBef>
-                <a:spcPts val="0"/>
-              </a:spcBef>
-              <a:spcAft>
-                <a:spcPts val="0"/>
-              </a:spcAft>
-              <a:buNone/>
-            </a:pPr>
-            <a:fld id="{00000000-1234-1234-1234-123412341234}" type="slidenum">
-              <a:rPr lang="en" smtClean="0"/>
-              <a:t>9</a:t>
-            </a:fld>
-            <a:endParaRPr lang="en"/>
-          </a:p>
-        </p:txBody>
-      </p:sp>
-      <p:pic>
-        <p:nvPicPr>
-          <p:cNvPr id="8" name="Picture 7" descr="Graphical user interface, text, application&#10;&#10;Description automatically generated">
-            <a:extLst>
-              <a:ext uri="{FF2B5EF4-FFF2-40B4-BE49-F238E27FC236}">
-                <a16:creationId xmlns:a16="http://schemas.microsoft.com/office/drawing/2014/main" id="{6BF6D327-99F9-4675-BB8E-EFABB98B06F8}"/>
-              </a:ext>
-            </a:extLst>
-          </p:cNvPr>
-          <p:cNvPicPr>
-            <a:picLocks noChangeAspect="1"/>
-          </p:cNvPicPr>
-          <p:nvPr/>
-        </p:nvPicPr>
-        <p:blipFill>
-          <a:blip r:embed="rId2"/>
-          <a:stretch>
-            <a:fillRect/>
-          </a:stretch>
-        </p:blipFill>
-        <p:spPr>
-          <a:xfrm>
-            <a:off x="990033" y="1471348"/>
-            <a:ext cx="5981608" cy="1548088"/>
-          </a:xfrm>
-          <a:prstGeom prst="rect">
-            <a:avLst/>
-          </a:prstGeom>
-          <a:effectLst>
-            <a:outerShdw blurRad="63500" sx="102000" sy="102000" algn="ctr" rotWithShape="0">
-              <a:srgbClr val="FF0000">
-                <a:alpha val="40000"/>
-              </a:srgbClr>
-            </a:outerShdw>
-          </a:effectLst>
-        </p:spPr>
-      </p:pic>
-      <p:pic>
-        <p:nvPicPr>
-          <p:cNvPr id="12" name="Picture 11" descr="Text&#10;&#10;Description automatically generated">
-            <a:extLst>
-              <a:ext uri="{FF2B5EF4-FFF2-40B4-BE49-F238E27FC236}">
-                <a16:creationId xmlns:a16="http://schemas.microsoft.com/office/drawing/2014/main" id="{0498353A-8733-4BA1-9D4A-CA0E4674CC62}"/>
-              </a:ext>
-            </a:extLst>
-          </p:cNvPr>
-          <p:cNvPicPr>
-            <a:picLocks noChangeAspect="1"/>
-          </p:cNvPicPr>
-          <p:nvPr/>
-        </p:nvPicPr>
-        <p:blipFill>
-          <a:blip r:embed="rId3"/>
-          <a:stretch>
-            <a:fillRect/>
-          </a:stretch>
-        </p:blipFill>
-        <p:spPr>
-          <a:xfrm>
-            <a:off x="990033" y="3391933"/>
-            <a:ext cx="7893925" cy="1212723"/>
-          </a:xfrm>
-          <a:prstGeom prst="rect">
-            <a:avLst/>
-          </a:prstGeom>
-          <a:effectLst>
-            <a:outerShdw blurRad="63500" sx="102000" sy="102000" algn="ctr" rotWithShape="0">
-              <a:srgbClr val="00B050">
-                <a:alpha val="40000"/>
-              </a:srgbClr>
-            </a:outerShdw>
-          </a:effectLst>
-        </p:spPr>
-      </p:pic>
-    </p:spTree>
-    <p:extLst>
-      <p:ext uri="{BB962C8B-B14F-4D97-AF65-F5344CB8AC3E}">
-        <p14:creationId xmlns:p14="http://schemas.microsoft.com/office/powerpoint/2010/main" val="2329200121"/>
-      </p:ext>
-    </p:extLst>
-  </p:cSld>
-  <p:clrMapOvr>
-    <a:masterClrMapping/>
-  </p:clrMapOvr>
-  <p:timing>
-    <p:tnLst>
-      <p:par>
-        <p:cTn id="1" dur="indefinite" restart="never" nodeType="tmRoot">
-          <p:childTnLst>
-            <p:seq concurrent="1" nextAc="seek">
-              <p:cTn id="2" dur="indefinite" nodeType="mainSeq">
-                <p:childTnLst>
-                  <p:par>
-                    <p:cTn id="3" fill="hold">
-                      <p:stCondLst>
-                        <p:cond delay="indefinite"/>
-                      </p:stCondLst>
-                      <p:childTnLst>
-                        <p:par>
-                          <p:cTn id="4" fill="hold">
-                            <p:stCondLst>
-                              <p:cond delay="0"/>
-                            </p:stCondLst>
-                            <p:childTnLst>
-                              <p:par>
-                                <p:cTn id="5" presetID="1" presetClass="entr" presetSubtype="0" fill="hold" nodeType="clickEffect">
-                                  <p:stCondLst>
-                                    <p:cond delay="0"/>
-                                  </p:stCondLst>
-                                  <p:childTnLst>
-                                    <p:set>
-                                      <p:cBhvr>
-                                        <p:cTn id="6" dur="1" fill="hold">
                                           <p:stCondLst>
                                             <p:cond delay="0"/>
                                           </p:stCondLst>

</xml_diff>